<commit_message>
add more on payment type and limit transaction
</commit_message>
<xml_diff>
--- a/Lloyds bussiness group and core divisions.pptx
+++ b/Lloyds bussiness group and core divisions.pptx
@@ -5,14 +5,12 @@
     <p:sldMasterId id="2147483648" r:id="rId1"/>
   </p:sldMasterIdLst>
   <p:notesMasterIdLst>
-    <p:notesMasterId r:id="rId7"/>
+    <p:notesMasterId r:id="rId5"/>
   </p:notesMasterIdLst>
   <p:sldIdLst>
     <p:sldId id="256" r:id="rId2"/>
-    <p:sldId id="257" r:id="rId3"/>
-    <p:sldId id="258" r:id="rId4"/>
-    <p:sldId id="259" r:id="rId5"/>
-    <p:sldId id="260" r:id="rId6"/>
+    <p:sldId id="258" r:id="rId3"/>
+    <p:sldId id="257" r:id="rId4"/>
   </p:sldIdLst>
   <p:sldSz cx="12192000" cy="6858000"/>
   <p:notesSz cx="6858000" cy="9144000"/>
@@ -111,6 +109,11 @@
       </a:defRPr>
     </a:lvl9pPr>
   </p:defaultTextStyle>
+  <p:extLst>
+    <p:ext uri="{EFAFB233-063F-42B5-8137-9DF3F51BA10A}">
+      <p15:sldGuideLst xmlns:p15="http://schemas.microsoft.com/office/powerpoint/2012/main"/>
+    </p:ext>
+  </p:extLst>
 </p:presentation>
 </file>
 
@@ -336,7 +339,7 @@
           <a:p>
             <a:fld id="{45D9013A-903E-E94E-A647-80771E85671C}" type="datetimeFigureOut">
               <a:rPr lang="en-TH" smtClean="0"/>
-              <a:t>19/2/2024 R</a:t>
+              <a:t>20/2/2024 R</a:t>
             </a:fld>
             <a:endParaRPr lang="en-TH"/>
           </a:p>
@@ -841,7 +844,7 @@
           <a:p>
             <a:fld id="{52D41933-9304-3C41-BE79-45A432516A73}" type="slidenum">
               <a:rPr lang="en-TH" smtClean="0"/>
-              <a:t>2</a:t>
+              <a:t>3</a:t>
             </a:fld>
             <a:endParaRPr lang="en-TH"/>
           </a:p>
@@ -1009,7 +1012,7 @@
           <a:p>
             <a:fld id="{AE407F23-24FA-A34B-B2D0-8A415FC42573}" type="datetimeFigureOut">
               <a:rPr lang="en-TH" smtClean="0"/>
-              <a:t>19/2/2024 R</a:t>
+              <a:t>20/2/2024 R</a:t>
             </a:fld>
             <a:endParaRPr lang="en-TH"/>
           </a:p>
@@ -1209,7 +1212,7 @@
           <a:p>
             <a:fld id="{AE407F23-24FA-A34B-B2D0-8A415FC42573}" type="datetimeFigureOut">
               <a:rPr lang="en-TH" smtClean="0"/>
-              <a:t>19/2/2024 R</a:t>
+              <a:t>20/2/2024 R</a:t>
             </a:fld>
             <a:endParaRPr lang="en-TH"/>
           </a:p>
@@ -1419,7 +1422,7 @@
           <a:p>
             <a:fld id="{AE407F23-24FA-A34B-B2D0-8A415FC42573}" type="datetimeFigureOut">
               <a:rPr lang="en-TH" smtClean="0"/>
-              <a:t>19/2/2024 R</a:t>
+              <a:t>20/2/2024 R</a:t>
             </a:fld>
             <a:endParaRPr lang="en-TH"/>
           </a:p>
@@ -1619,7 +1622,7 @@
           <a:p>
             <a:fld id="{AE407F23-24FA-A34B-B2D0-8A415FC42573}" type="datetimeFigureOut">
               <a:rPr lang="en-TH" smtClean="0"/>
-              <a:t>19/2/2024 R</a:t>
+              <a:t>20/2/2024 R</a:t>
             </a:fld>
             <a:endParaRPr lang="en-TH"/>
           </a:p>
@@ -1895,7 +1898,7 @@
           <a:p>
             <a:fld id="{AE407F23-24FA-A34B-B2D0-8A415FC42573}" type="datetimeFigureOut">
               <a:rPr lang="en-TH" smtClean="0"/>
-              <a:t>19/2/2024 R</a:t>
+              <a:t>20/2/2024 R</a:t>
             </a:fld>
             <a:endParaRPr lang="en-TH"/>
           </a:p>
@@ -2163,7 +2166,7 @@
           <a:p>
             <a:fld id="{AE407F23-24FA-A34B-B2D0-8A415FC42573}" type="datetimeFigureOut">
               <a:rPr lang="en-TH" smtClean="0"/>
-              <a:t>19/2/2024 R</a:t>
+              <a:t>20/2/2024 R</a:t>
             </a:fld>
             <a:endParaRPr lang="en-TH"/>
           </a:p>
@@ -2578,7 +2581,7 @@
           <a:p>
             <a:fld id="{AE407F23-24FA-A34B-B2D0-8A415FC42573}" type="datetimeFigureOut">
               <a:rPr lang="en-TH" smtClean="0"/>
-              <a:t>19/2/2024 R</a:t>
+              <a:t>20/2/2024 R</a:t>
             </a:fld>
             <a:endParaRPr lang="en-TH"/>
           </a:p>
@@ -2720,7 +2723,7 @@
           <a:p>
             <a:fld id="{AE407F23-24FA-A34B-B2D0-8A415FC42573}" type="datetimeFigureOut">
               <a:rPr lang="en-TH" smtClean="0"/>
-              <a:t>19/2/2024 R</a:t>
+              <a:t>20/2/2024 R</a:t>
             </a:fld>
             <a:endParaRPr lang="en-TH"/>
           </a:p>
@@ -2833,7 +2836,7 @@
           <a:p>
             <a:fld id="{AE407F23-24FA-A34B-B2D0-8A415FC42573}" type="datetimeFigureOut">
               <a:rPr lang="en-TH" smtClean="0"/>
-              <a:t>19/2/2024 R</a:t>
+              <a:t>20/2/2024 R</a:t>
             </a:fld>
             <a:endParaRPr lang="en-TH"/>
           </a:p>
@@ -3146,7 +3149,7 @@
           <a:p>
             <a:fld id="{AE407F23-24FA-A34B-B2D0-8A415FC42573}" type="datetimeFigureOut">
               <a:rPr lang="en-TH" smtClean="0"/>
-              <a:t>19/2/2024 R</a:t>
+              <a:t>20/2/2024 R</a:t>
             </a:fld>
             <a:endParaRPr lang="en-TH"/>
           </a:p>
@@ -3435,7 +3438,7 @@
           <a:p>
             <a:fld id="{AE407F23-24FA-A34B-B2D0-8A415FC42573}" type="datetimeFigureOut">
               <a:rPr lang="en-TH" smtClean="0"/>
-              <a:t>19/2/2024 R</a:t>
+              <a:t>20/2/2024 R</a:t>
             </a:fld>
             <a:endParaRPr lang="en-TH"/>
           </a:p>
@@ -3678,7 +3681,7 @@
           <a:p>
             <a:fld id="{AE407F23-24FA-A34B-B2D0-8A415FC42573}" type="datetimeFigureOut">
               <a:rPr lang="en-TH" smtClean="0"/>
-              <a:t>19/2/2024 R</a:t>
+              <a:t>20/2/2024 R</a:t>
             </a:fld>
             <a:endParaRPr lang="en-TH"/>
           </a:p>
@@ -4190,6 +4193,443 @@
           <a:chExt cx="0" cy="0"/>
         </a:xfrm>
       </p:grpSpPr>
+      <p:graphicFrame>
+        <p:nvGraphicFramePr>
+          <p:cNvPr id="6" name="Table 5">
+            <a:extLst>
+              <a:ext uri="{FF2B5EF4-FFF2-40B4-BE49-F238E27FC236}">
+                <a16:creationId xmlns:a16="http://schemas.microsoft.com/office/drawing/2014/main" id="{64D02719-E0BE-A751-4DCD-7CA0A3250E59}"/>
+              </a:ext>
+            </a:extLst>
+          </p:cNvPr>
+          <p:cNvGraphicFramePr>
+            <a:graphicFrameLocks noGrp="1"/>
+          </p:cNvGraphicFramePr>
+          <p:nvPr>
+            <p:extLst>
+              <p:ext uri="{D42A27DB-BD31-4B8C-83A1-F6EECF244321}">
+                <p14:modId xmlns:p14="http://schemas.microsoft.com/office/powerpoint/2010/main" val="3114765560"/>
+              </p:ext>
+            </p:extLst>
+          </p:nvPr>
+        </p:nvGraphicFramePr>
+        <p:xfrm>
+          <a:off x="791922" y="294640"/>
+          <a:ext cx="10218456" cy="6066694"/>
+        </p:xfrm>
+        <a:graphic>
+          <a:graphicData uri="http://schemas.openxmlformats.org/drawingml/2006/table">
+            <a:tbl>
+              <a:tblPr firstRow="1" bandRow="1">
+                <a:tableStyleId>{5C22544A-7EE6-4342-B048-85BDC9FD1C3A}</a:tableStyleId>
+              </a:tblPr>
+              <a:tblGrid>
+                <a:gridCol w="5109228">
+                  <a:extLst>
+                    <a:ext uri="{9D8B030D-6E8A-4147-A177-3AD203B41FA5}">
+                      <a16:colId xmlns:a16="http://schemas.microsoft.com/office/drawing/2014/main" val="1707069315"/>
+                    </a:ext>
+                  </a:extLst>
+                </a:gridCol>
+                <a:gridCol w="5109228">
+                  <a:extLst>
+                    <a:ext uri="{9D8B030D-6E8A-4147-A177-3AD203B41FA5}">
+                      <a16:colId xmlns:a16="http://schemas.microsoft.com/office/drawing/2014/main" val="146929260"/>
+                    </a:ext>
+                  </a:extLst>
+                </a:gridCol>
+              </a:tblGrid>
+              <a:tr h="0">
+                <a:tc>
+                  <a:txBody>
+                    <a:bodyPr/>
+                    <a:lstStyle/>
+                    <a:p>
+                      <a:pPr algn="l" fontAlgn="base"/>
+                      <a:r>
+                        <a:rPr lang="en-US" b="1" cap="all" dirty="0">
+                          <a:solidFill>
+                            <a:srgbClr val="505050"/>
+                          </a:solidFill>
+                          <a:effectLst/>
+                          <a:latin typeface="Lloyds Jack Medium"/>
+                        </a:rPr>
+                        <a:t>Payment type</a:t>
+                      </a:r>
+                    </a:p>
+                  </a:txBody>
+                  <a:tcPr marL="228600" marR="228600" marT="228600" marB="228600"/>
+                </a:tc>
+                <a:tc>
+                  <a:txBody>
+                    <a:bodyPr/>
+                    <a:lstStyle/>
+                    <a:p>
+                      <a:pPr algn="l" fontAlgn="base"/>
+                      <a:r>
+                        <a:rPr lang="en-US" b="1" cap="all" dirty="0">
+                          <a:solidFill>
+                            <a:srgbClr val="505050"/>
+                          </a:solidFill>
+                          <a:effectLst/>
+                          <a:latin typeface="Lloyds Jack Medium"/>
+                        </a:rPr>
+                        <a:t>Daily limit</a:t>
+                      </a:r>
+                    </a:p>
+                  </a:txBody>
+                  <a:tcPr marL="228600" marR="228600" marT="228600" marB="228600"/>
+                </a:tc>
+                <a:extLst>
+                  <a:ext uri="{0D108BD9-81ED-4DB2-BD59-A6C34878D82A}">
+                    <a16:rowId xmlns:a16="http://schemas.microsoft.com/office/drawing/2014/main" val="2015221849"/>
+                  </a:ext>
+                </a:extLst>
+              </a:tr>
+              <a:tr h="2100835">
+                <a:tc>
+                  <a:txBody>
+                    <a:bodyPr/>
+                    <a:lstStyle/>
+                    <a:p>
+                      <a:pPr fontAlgn="base"/>
+                      <a:r>
+                        <a:rPr lang="en-US" b="1" dirty="0">
+                          <a:solidFill>
+                            <a:srgbClr val="333333"/>
+                          </a:solidFill>
+                          <a:effectLst/>
+                          <a:latin typeface="Lloyds Jack Medium"/>
+                        </a:rPr>
+                        <a:t>Faster Payments</a:t>
+                      </a:r>
+                      <a:endParaRPr lang="en-US" b="1" dirty="0">
+                        <a:solidFill>
+                          <a:srgbClr val="333333"/>
+                        </a:solidFill>
+                        <a:effectLst/>
+                        <a:latin typeface="Lloyds Jack Regular"/>
+                      </a:endParaRPr>
+                    </a:p>
+                    <a:p>
+                      <a:pPr fontAlgn="base"/>
+                      <a:r>
+                        <a:rPr lang="en-US" b="0" dirty="0">
+                          <a:solidFill>
+                            <a:srgbClr val="333333"/>
+                          </a:solidFill>
+                          <a:effectLst/>
+                          <a:latin typeface="Lloyds Jack Regular"/>
+                        </a:rPr>
+                        <a:t>Payments to another UK account will normally be sent this way.</a:t>
+                      </a:r>
+                    </a:p>
+                  </a:txBody>
+                  <a:tcPr marL="228600" marR="228600" marT="228600" marB="228600"/>
+                </a:tc>
+                <a:tc>
+                  <a:txBody>
+                    <a:bodyPr/>
+                    <a:lstStyle/>
+                    <a:p>
+                      <a:pPr fontAlgn="base"/>
+                      <a:r>
+                        <a:rPr lang="en-US" b="0" dirty="0">
+                          <a:solidFill>
+                            <a:srgbClr val="333333"/>
+                          </a:solidFill>
+                          <a:effectLst/>
+                          <a:latin typeface="Lloyds Jack Regular"/>
+                        </a:rPr>
+                        <a:t>Online: up to £25,000</a:t>
+                      </a:r>
+                    </a:p>
+                    <a:p>
+                      <a:pPr fontAlgn="base"/>
+                      <a:r>
+                        <a:rPr lang="en-US" b="0" dirty="0">
+                          <a:solidFill>
+                            <a:srgbClr val="333333"/>
+                          </a:solidFill>
+                          <a:effectLst/>
+                          <a:latin typeface="Lloyds Jack Regular"/>
+                        </a:rPr>
+                        <a:t>In branch: up to £250,000 with </a:t>
+                      </a:r>
+                      <a:r>
+                        <a:rPr lang="en-US" b="0" u="sng" dirty="0">
+                          <a:solidFill>
+                            <a:srgbClr val="006A4D"/>
+                          </a:solidFill>
+                          <a:effectLst/>
+                          <a:latin typeface="Lloyds Jack Light"/>
+                          <a:hlinkClick r:id="rId2"/>
+                        </a:rPr>
+                        <a:t>valid identification</a:t>
+                      </a:r>
+                      <a:endParaRPr lang="en-US" b="0" dirty="0">
+                        <a:solidFill>
+                          <a:srgbClr val="333333"/>
+                        </a:solidFill>
+                        <a:effectLst/>
+                        <a:latin typeface="Lloyds Jack Regular"/>
+                      </a:endParaRPr>
+                    </a:p>
+                    <a:p>
+                      <a:pPr fontAlgn="base"/>
+                      <a:r>
+                        <a:rPr lang="en-US" b="0" dirty="0">
+                          <a:solidFill>
+                            <a:srgbClr val="333333"/>
+                          </a:solidFill>
+                          <a:effectLst/>
+                          <a:latin typeface="Lloyds Jack Regular"/>
+                        </a:rPr>
+                        <a:t>Phone: up to £25,000</a:t>
+                      </a:r>
+                    </a:p>
+                    <a:p>
+                      <a:pPr fontAlgn="base"/>
+                      <a:r>
+                        <a:rPr lang="en-US" b="0" dirty="0">
+                          <a:solidFill>
+                            <a:srgbClr val="333333"/>
+                          </a:solidFill>
+                          <a:effectLst/>
+                          <a:latin typeface="Lloyds Jack Regular"/>
+                        </a:rPr>
+                        <a:t>Your limit includes payments you set up for a future date and increases to existing future payments.</a:t>
+                      </a:r>
+                    </a:p>
+                  </a:txBody>
+                  <a:tcPr marL="228600" marR="228600" marT="228600" marB="228600"/>
+                </a:tc>
+                <a:extLst>
+                  <a:ext uri="{0D108BD9-81ED-4DB2-BD59-A6C34878D82A}">
+                    <a16:rowId xmlns:a16="http://schemas.microsoft.com/office/drawing/2014/main" val="3800006957"/>
+                  </a:ext>
+                </a:extLst>
+              </a:tr>
+              <a:tr h="1858431">
+                <a:tc>
+                  <a:txBody>
+                    <a:bodyPr/>
+                    <a:lstStyle/>
+                    <a:p>
+                      <a:pPr fontAlgn="base"/>
+                      <a:r>
+                        <a:rPr lang="en-US" b="1" dirty="0">
+                          <a:solidFill>
+                            <a:srgbClr val="333333"/>
+                          </a:solidFill>
+                          <a:effectLst/>
+                          <a:latin typeface="Lloyds Jack Medium"/>
+                        </a:rPr>
+                        <a:t>Standing orders</a:t>
+                      </a:r>
+                      <a:endParaRPr lang="en-US" b="1" dirty="0">
+                        <a:solidFill>
+                          <a:srgbClr val="333333"/>
+                        </a:solidFill>
+                        <a:effectLst/>
+                        <a:latin typeface="Lloyds Jack Regular"/>
+                      </a:endParaRPr>
+                    </a:p>
+                    <a:p>
+                      <a:pPr fontAlgn="base"/>
+                      <a:r>
+                        <a:rPr lang="en-US" b="0" dirty="0">
+                          <a:solidFill>
+                            <a:srgbClr val="333333"/>
+                          </a:solidFill>
+                          <a:effectLst/>
+                          <a:latin typeface="Lloyds Jack Regular"/>
+                        </a:rPr>
+                        <a:t>Lets you regularly send a set amount of money to another account.</a:t>
+                      </a:r>
+                    </a:p>
+                  </a:txBody>
+                  <a:tcPr marL="228600" marR="228600" marT="228600" marB="228600"/>
+                </a:tc>
+                <a:tc>
+                  <a:txBody>
+                    <a:bodyPr/>
+                    <a:lstStyle/>
+                    <a:p>
+                      <a:pPr fontAlgn="base"/>
+                      <a:r>
+                        <a:rPr lang="en-US" b="0" dirty="0">
+                          <a:solidFill>
+                            <a:srgbClr val="333333"/>
+                          </a:solidFill>
+                          <a:effectLst/>
+                          <a:latin typeface="Lloyds Jack Regular"/>
+                        </a:rPr>
+                        <a:t>Online: up to £25,000</a:t>
+                      </a:r>
+                    </a:p>
+                    <a:p>
+                      <a:pPr fontAlgn="base"/>
+                      <a:r>
+                        <a:rPr lang="en-US" b="0" dirty="0">
+                          <a:solidFill>
+                            <a:srgbClr val="333333"/>
+                          </a:solidFill>
+                          <a:effectLst/>
+                          <a:latin typeface="Lloyds Jack Regular"/>
+                        </a:rPr>
+                        <a:t>In branch: up to £100,000</a:t>
+                      </a:r>
+                    </a:p>
+                    <a:p>
+                      <a:pPr fontAlgn="base"/>
+                      <a:r>
+                        <a:rPr lang="en-US" b="0" dirty="0">
+                          <a:solidFill>
+                            <a:srgbClr val="333333"/>
+                          </a:solidFill>
+                          <a:effectLst/>
+                          <a:latin typeface="Lloyds Jack Regular"/>
+                        </a:rPr>
+                        <a:t>Phone: up to £25,000</a:t>
+                      </a:r>
+                    </a:p>
+                    <a:p>
+                      <a:pPr fontAlgn="base"/>
+                      <a:r>
+                        <a:rPr lang="en-US" b="0" dirty="0">
+                          <a:solidFill>
+                            <a:srgbClr val="333333"/>
+                          </a:solidFill>
+                          <a:effectLst/>
+                          <a:latin typeface="Lloyds Jack Regular"/>
+                        </a:rPr>
+                        <a:t>Your limit includes new standing orders and increases to existing standing orders.</a:t>
+                      </a:r>
+                    </a:p>
+                  </a:txBody>
+                  <a:tcPr marL="228600" marR="228600" marT="228600" marB="228600"/>
+                </a:tc>
+                <a:extLst>
+                  <a:ext uri="{0D108BD9-81ED-4DB2-BD59-A6C34878D82A}">
+                    <a16:rowId xmlns:a16="http://schemas.microsoft.com/office/drawing/2014/main" val="821888925"/>
+                  </a:ext>
+                </a:extLst>
+              </a:tr>
+              <a:tr h="1373623">
+                <a:tc>
+                  <a:txBody>
+                    <a:bodyPr/>
+                    <a:lstStyle/>
+                    <a:p>
+                      <a:pPr fontAlgn="base"/>
+                      <a:r>
+                        <a:rPr lang="en-US" b="1" dirty="0">
+                          <a:solidFill>
+                            <a:srgbClr val="333333"/>
+                          </a:solidFill>
+                          <a:effectLst/>
+                          <a:latin typeface="Lloyds Jack Medium"/>
+                        </a:rPr>
+                        <a:t>Cash withdrawals</a:t>
+                      </a:r>
+                      <a:endParaRPr lang="en-US" b="1" dirty="0">
+                        <a:solidFill>
+                          <a:srgbClr val="333333"/>
+                        </a:solidFill>
+                        <a:effectLst/>
+                        <a:latin typeface="Lloyds Jack Regular"/>
+                      </a:endParaRPr>
+                    </a:p>
+                    <a:p>
+                      <a:pPr fontAlgn="base"/>
+                      <a:r>
+                        <a:rPr lang="en-US" b="0" dirty="0">
+                          <a:solidFill>
+                            <a:srgbClr val="333333"/>
+                          </a:solidFill>
+                          <a:effectLst/>
+                          <a:latin typeface="Lloyds Jack Regular"/>
+                        </a:rPr>
+                        <a:t>Take cash from your account.</a:t>
+                      </a:r>
+                    </a:p>
+                  </a:txBody>
+                  <a:tcPr marL="228600" marR="228600" marT="228600" marB="228600"/>
+                </a:tc>
+                <a:tc>
+                  <a:txBody>
+                    <a:bodyPr/>
+                    <a:lstStyle/>
+                    <a:p>
+                      <a:pPr fontAlgn="base"/>
+                      <a:r>
+                        <a:rPr lang="en-US" b="0" dirty="0">
+                          <a:solidFill>
+                            <a:srgbClr val="333333"/>
+                          </a:solidFill>
+                          <a:effectLst/>
+                          <a:latin typeface="Lloyds Jack Regular"/>
+                        </a:rPr>
+                        <a:t>Cash machines or cashback: up to £800</a:t>
+                      </a:r>
+                    </a:p>
+                    <a:p>
+                      <a:pPr fontAlgn="base"/>
+                      <a:r>
+                        <a:rPr lang="en-US" b="0" dirty="0">
+                          <a:solidFill>
+                            <a:srgbClr val="333333"/>
+                          </a:solidFill>
+                          <a:effectLst/>
+                          <a:latin typeface="Lloyds Jack Regular"/>
+                        </a:rPr>
+                        <a:t>In branch: no limits, but please order large amounts in advance.</a:t>
+                      </a:r>
+                    </a:p>
+                  </a:txBody>
+                  <a:tcPr marL="228600" marR="228600" marT="228600" marB="228600"/>
+                </a:tc>
+                <a:extLst>
+                  <a:ext uri="{0D108BD9-81ED-4DB2-BD59-A6C34878D82A}">
+                    <a16:rowId xmlns:a16="http://schemas.microsoft.com/office/drawing/2014/main" val="2398832274"/>
+                  </a:ext>
+                </a:extLst>
+              </a:tr>
+            </a:tbl>
+          </a:graphicData>
+        </a:graphic>
+      </p:graphicFrame>
+    </p:spTree>
+    <p:extLst>
+      <p:ext uri="{BB962C8B-B14F-4D97-AF65-F5344CB8AC3E}">
+        <p14:creationId xmlns:p14="http://schemas.microsoft.com/office/powerpoint/2010/main" val="1093376476"/>
+      </p:ext>
+    </p:extLst>
+  </p:cSld>
+  <p:clrMapOvr>
+    <a:masterClrMapping/>
+  </p:clrMapOvr>
+</p:sld>
+</file>
+
+<file path=ppt/slides/slide3.xml><?xml version="1.0" encoding="utf-8"?>
+<p:sld xmlns:a="http://schemas.openxmlformats.org/drawingml/2006/main" xmlns:r="http://schemas.openxmlformats.org/officeDocument/2006/relationships" xmlns:p="http://schemas.openxmlformats.org/presentationml/2006/main">
+  <p:cSld>
+    <p:spTree>
+      <p:nvGrpSpPr>
+        <p:cNvPr id="1" name=""/>
+        <p:cNvGrpSpPr/>
+        <p:nvPr/>
+      </p:nvGrpSpPr>
+      <p:grpSpPr>
+        <a:xfrm>
+          <a:off x="0" y="0"/>
+          <a:ext cx="0" cy="0"/>
+          <a:chOff x="0" y="0"/>
+          <a:chExt cx="0" cy="0"/>
+        </a:xfrm>
+      </p:grpSpPr>
       <p:pic>
         <p:nvPicPr>
           <p:cNvPr id="4" name="Content Placeholder 3">
@@ -4387,8 +4827,8 @@
           </a:p>
         </p:txBody>
       </p:sp>
-      <mc:AlternateContent xmlns:mc="http://schemas.openxmlformats.org/markup-compatibility/2006">
-        <mc:Choice xmlns:p14="http://schemas.microsoft.com/office/powerpoint/2010/main" Requires="p14">
+      <mc:AlternateContent xmlns:mc="http://schemas.openxmlformats.org/markup-compatibility/2006" xmlns:p14="http://schemas.microsoft.com/office/powerpoint/2010/main">
+        <mc:Choice Requires="p14">
           <p:contentPart p14:bwMode="auto" r:id="rId4">
             <p14:nvContentPartPr>
               <p14:cNvPr id="6" name="Ink 5">
@@ -4407,7 +4847,7 @@
             </p14:xfrm>
           </p:contentPart>
         </mc:Choice>
-        <mc:Fallback>
+        <mc:Fallback xmlns="">
           <p:pic>
             <p:nvPicPr>
               <p:cNvPr id="6" name="Ink 5">
@@ -4438,8 +4878,8 @@
           </p:pic>
         </mc:Fallback>
       </mc:AlternateContent>
-      <mc:AlternateContent xmlns:mc="http://schemas.openxmlformats.org/markup-compatibility/2006">
-        <mc:Choice xmlns:p14="http://schemas.microsoft.com/office/powerpoint/2010/main" Requires="p14">
+      <mc:AlternateContent xmlns:mc="http://schemas.openxmlformats.org/markup-compatibility/2006" xmlns:p14="http://schemas.microsoft.com/office/powerpoint/2010/main">
+        <mc:Choice Requires="p14">
           <p:contentPart p14:bwMode="auto" r:id="rId6">
             <p14:nvContentPartPr>
               <p14:cNvPr id="7" name="Ink 6">
@@ -4458,7 +4898,7 @@
             </p14:xfrm>
           </p:contentPart>
         </mc:Choice>
-        <mc:Fallback>
+        <mc:Fallback xmlns="">
           <p:pic>
             <p:nvPicPr>
               <p:cNvPr id="7" name="Ink 6">
@@ -4489,8 +4929,8 @@
           </p:pic>
         </mc:Fallback>
       </mc:AlternateContent>
-      <mc:AlternateContent xmlns:mc="http://schemas.openxmlformats.org/markup-compatibility/2006">
-        <mc:Choice xmlns:p14="http://schemas.microsoft.com/office/powerpoint/2010/main" Requires="p14">
+      <mc:AlternateContent xmlns:mc="http://schemas.openxmlformats.org/markup-compatibility/2006" xmlns:p14="http://schemas.microsoft.com/office/powerpoint/2010/main">
+        <mc:Choice Requires="p14">
           <p:contentPart p14:bwMode="auto" r:id="rId8">
             <p14:nvContentPartPr>
               <p14:cNvPr id="8" name="Ink 7">
@@ -4509,7 +4949,7 @@
             </p14:xfrm>
           </p:contentPart>
         </mc:Choice>
-        <mc:Fallback>
+        <mc:Fallback xmlns="">
           <p:pic>
             <p:nvPicPr>
               <p:cNvPr id="8" name="Ink 7">
@@ -4540,8 +4980,8 @@
           </p:pic>
         </mc:Fallback>
       </mc:AlternateContent>
-      <mc:AlternateContent xmlns:mc="http://schemas.openxmlformats.org/markup-compatibility/2006">
-        <mc:Choice xmlns:p14="http://schemas.microsoft.com/office/powerpoint/2010/main" Requires="p14">
+      <mc:AlternateContent xmlns:mc="http://schemas.openxmlformats.org/markup-compatibility/2006" xmlns:p14="http://schemas.microsoft.com/office/powerpoint/2010/main">
+        <mc:Choice Requires="p14">
           <p:contentPart p14:bwMode="auto" r:id="rId10">
             <p14:nvContentPartPr>
               <p14:cNvPr id="10" name="Ink 9">
@@ -4560,7 +5000,7 @@
             </p14:xfrm>
           </p:contentPart>
         </mc:Choice>
-        <mc:Fallback>
+        <mc:Fallback xmlns="">
           <p:pic>
             <p:nvPicPr>
               <p:cNvPr id="10" name="Ink 9">
@@ -4591,8 +5031,8 @@
           </p:pic>
         </mc:Fallback>
       </mc:AlternateContent>
-      <mc:AlternateContent xmlns:mc="http://schemas.openxmlformats.org/markup-compatibility/2006">
-        <mc:Choice xmlns:p14="http://schemas.microsoft.com/office/powerpoint/2010/main" Requires="p14">
+      <mc:AlternateContent xmlns:mc="http://schemas.openxmlformats.org/markup-compatibility/2006" xmlns:p14="http://schemas.microsoft.com/office/powerpoint/2010/main">
+        <mc:Choice Requires="p14">
           <p:contentPart p14:bwMode="auto" r:id="rId12">
             <p14:nvContentPartPr>
               <p14:cNvPr id="11" name="Ink 10">
@@ -4611,7 +5051,7 @@
             </p14:xfrm>
           </p:contentPart>
         </mc:Choice>
-        <mc:Fallback>
+        <mc:Fallback xmlns="">
           <p:pic>
             <p:nvPicPr>
               <p:cNvPr id="11" name="Ink 10">
@@ -4646,246 +5086,6 @@
     <p:extLst>
       <p:ext uri="{BB962C8B-B14F-4D97-AF65-F5344CB8AC3E}">
         <p14:creationId xmlns:p14="http://schemas.microsoft.com/office/powerpoint/2010/main" val="2495320282"/>
-      </p:ext>
-    </p:extLst>
-  </p:cSld>
-  <p:clrMapOvr>
-    <a:masterClrMapping/>
-  </p:clrMapOvr>
-</p:sld>
-</file>
-
-<file path=ppt/slides/slide3.xml><?xml version="1.0" encoding="utf-8"?>
-<p:sld xmlns:a="http://schemas.openxmlformats.org/drawingml/2006/main" xmlns:r="http://schemas.openxmlformats.org/officeDocument/2006/relationships" xmlns:p="http://schemas.openxmlformats.org/presentationml/2006/main">
-  <p:cSld>
-    <p:spTree>
-      <p:nvGrpSpPr>
-        <p:cNvPr id="1" name=""/>
-        <p:cNvGrpSpPr/>
-        <p:nvPr/>
-      </p:nvGrpSpPr>
-      <p:grpSpPr>
-        <a:xfrm>
-          <a:off x="0" y="0"/>
-          <a:ext cx="0" cy="0"/>
-          <a:chOff x="0" y="0"/>
-          <a:chExt cx="0" cy="0"/>
-        </a:xfrm>
-      </p:grpSpPr>
-      <p:sp>
-        <p:nvSpPr>
-          <p:cNvPr id="2" name="Title 1">
-            <a:extLst>
-              <a:ext uri="{FF2B5EF4-FFF2-40B4-BE49-F238E27FC236}">
-                <a16:creationId xmlns:a16="http://schemas.microsoft.com/office/drawing/2014/main" id="{F1D5803F-4B5C-F039-AAA8-2F844CD1104E}"/>
-              </a:ext>
-            </a:extLst>
-          </p:cNvPr>
-          <p:cNvSpPr>
-            <a:spLocks noGrp="1"/>
-          </p:cNvSpPr>
-          <p:nvPr>
-            <p:ph type="title"/>
-          </p:nvPr>
-        </p:nvSpPr>
-        <p:spPr/>
-        <p:txBody>
-          <a:bodyPr/>
-          <a:lstStyle/>
-          <a:p>
-            <a:endParaRPr lang="en-TH"/>
-          </a:p>
-        </p:txBody>
-      </p:sp>
-      <p:sp>
-        <p:nvSpPr>
-          <p:cNvPr id="3" name="Content Placeholder 2">
-            <a:extLst>
-              <a:ext uri="{FF2B5EF4-FFF2-40B4-BE49-F238E27FC236}">
-                <a16:creationId xmlns:a16="http://schemas.microsoft.com/office/drawing/2014/main" id="{210A4E62-A0AE-8519-BC6C-1A2046DB4B51}"/>
-              </a:ext>
-            </a:extLst>
-          </p:cNvPr>
-          <p:cNvSpPr>
-            <a:spLocks noGrp="1"/>
-          </p:cNvSpPr>
-          <p:nvPr>
-            <p:ph idx="1"/>
-          </p:nvPr>
-        </p:nvSpPr>
-        <p:spPr/>
-        <p:txBody>
-          <a:bodyPr/>
-          <a:lstStyle/>
-          <a:p>
-            <a:endParaRPr lang="en-TH"/>
-          </a:p>
-        </p:txBody>
-      </p:sp>
-    </p:spTree>
-    <p:extLst>
-      <p:ext uri="{BB962C8B-B14F-4D97-AF65-F5344CB8AC3E}">
-        <p14:creationId xmlns:p14="http://schemas.microsoft.com/office/powerpoint/2010/main" val="1093376476"/>
-      </p:ext>
-    </p:extLst>
-  </p:cSld>
-  <p:clrMapOvr>
-    <a:masterClrMapping/>
-  </p:clrMapOvr>
-</p:sld>
-</file>
-
-<file path=ppt/slides/slide4.xml><?xml version="1.0" encoding="utf-8"?>
-<p:sld xmlns:a="http://schemas.openxmlformats.org/drawingml/2006/main" xmlns:r="http://schemas.openxmlformats.org/officeDocument/2006/relationships" xmlns:p="http://schemas.openxmlformats.org/presentationml/2006/main">
-  <p:cSld>
-    <p:spTree>
-      <p:nvGrpSpPr>
-        <p:cNvPr id="1" name=""/>
-        <p:cNvGrpSpPr/>
-        <p:nvPr/>
-      </p:nvGrpSpPr>
-      <p:grpSpPr>
-        <a:xfrm>
-          <a:off x="0" y="0"/>
-          <a:ext cx="0" cy="0"/>
-          <a:chOff x="0" y="0"/>
-          <a:chExt cx="0" cy="0"/>
-        </a:xfrm>
-      </p:grpSpPr>
-      <p:sp>
-        <p:nvSpPr>
-          <p:cNvPr id="2" name="Title 1">
-            <a:extLst>
-              <a:ext uri="{FF2B5EF4-FFF2-40B4-BE49-F238E27FC236}">
-                <a16:creationId xmlns:a16="http://schemas.microsoft.com/office/drawing/2014/main" id="{EB24763F-6E30-1E58-752B-BF4470F99D66}"/>
-              </a:ext>
-            </a:extLst>
-          </p:cNvPr>
-          <p:cNvSpPr>
-            <a:spLocks noGrp="1"/>
-          </p:cNvSpPr>
-          <p:nvPr>
-            <p:ph type="title"/>
-          </p:nvPr>
-        </p:nvSpPr>
-        <p:spPr/>
-        <p:txBody>
-          <a:bodyPr/>
-          <a:lstStyle/>
-          <a:p>
-            <a:endParaRPr lang="en-TH"/>
-          </a:p>
-        </p:txBody>
-      </p:sp>
-      <p:sp>
-        <p:nvSpPr>
-          <p:cNvPr id="3" name="Content Placeholder 2">
-            <a:extLst>
-              <a:ext uri="{FF2B5EF4-FFF2-40B4-BE49-F238E27FC236}">
-                <a16:creationId xmlns:a16="http://schemas.microsoft.com/office/drawing/2014/main" id="{66070D20-9319-A55C-FB6A-2A74D59419D9}"/>
-              </a:ext>
-            </a:extLst>
-          </p:cNvPr>
-          <p:cNvSpPr>
-            <a:spLocks noGrp="1"/>
-          </p:cNvSpPr>
-          <p:nvPr>
-            <p:ph idx="1"/>
-          </p:nvPr>
-        </p:nvSpPr>
-        <p:spPr/>
-        <p:txBody>
-          <a:bodyPr/>
-          <a:lstStyle/>
-          <a:p>
-            <a:endParaRPr lang="en-TH"/>
-          </a:p>
-        </p:txBody>
-      </p:sp>
-    </p:spTree>
-    <p:extLst>
-      <p:ext uri="{BB962C8B-B14F-4D97-AF65-F5344CB8AC3E}">
-        <p14:creationId xmlns:p14="http://schemas.microsoft.com/office/powerpoint/2010/main" val="1483323248"/>
-      </p:ext>
-    </p:extLst>
-  </p:cSld>
-  <p:clrMapOvr>
-    <a:masterClrMapping/>
-  </p:clrMapOvr>
-</p:sld>
-</file>
-
-<file path=ppt/slides/slide5.xml><?xml version="1.0" encoding="utf-8"?>
-<p:sld xmlns:a="http://schemas.openxmlformats.org/drawingml/2006/main" xmlns:r="http://schemas.openxmlformats.org/officeDocument/2006/relationships" xmlns:p="http://schemas.openxmlformats.org/presentationml/2006/main">
-  <p:cSld>
-    <p:spTree>
-      <p:nvGrpSpPr>
-        <p:cNvPr id="1" name=""/>
-        <p:cNvGrpSpPr/>
-        <p:nvPr/>
-      </p:nvGrpSpPr>
-      <p:grpSpPr>
-        <a:xfrm>
-          <a:off x="0" y="0"/>
-          <a:ext cx="0" cy="0"/>
-          <a:chOff x="0" y="0"/>
-          <a:chExt cx="0" cy="0"/>
-        </a:xfrm>
-      </p:grpSpPr>
-      <p:sp>
-        <p:nvSpPr>
-          <p:cNvPr id="2" name="Title 1">
-            <a:extLst>
-              <a:ext uri="{FF2B5EF4-FFF2-40B4-BE49-F238E27FC236}">
-                <a16:creationId xmlns:a16="http://schemas.microsoft.com/office/drawing/2014/main" id="{43B0B9EE-8C6B-FFC6-F00D-ED98E5DB649E}"/>
-              </a:ext>
-            </a:extLst>
-          </p:cNvPr>
-          <p:cNvSpPr>
-            <a:spLocks noGrp="1"/>
-          </p:cNvSpPr>
-          <p:nvPr>
-            <p:ph type="title"/>
-          </p:nvPr>
-        </p:nvSpPr>
-        <p:spPr/>
-        <p:txBody>
-          <a:bodyPr/>
-          <a:lstStyle/>
-          <a:p>
-            <a:endParaRPr lang="en-TH"/>
-          </a:p>
-        </p:txBody>
-      </p:sp>
-      <p:sp>
-        <p:nvSpPr>
-          <p:cNvPr id="3" name="Content Placeholder 2">
-            <a:extLst>
-              <a:ext uri="{FF2B5EF4-FFF2-40B4-BE49-F238E27FC236}">
-                <a16:creationId xmlns:a16="http://schemas.microsoft.com/office/drawing/2014/main" id="{426FEAE0-E502-3417-8856-3DD0DD263A8E}"/>
-              </a:ext>
-            </a:extLst>
-          </p:cNvPr>
-          <p:cNvSpPr>
-            <a:spLocks noGrp="1"/>
-          </p:cNvSpPr>
-          <p:nvPr>
-            <p:ph idx="1"/>
-          </p:nvPr>
-        </p:nvSpPr>
-        <p:spPr/>
-        <p:txBody>
-          <a:bodyPr/>
-          <a:lstStyle/>
-          <a:p>
-            <a:endParaRPr lang="en-TH"/>
-          </a:p>
-        </p:txBody>
-      </p:sp>
-    </p:spTree>
-    <p:extLst>
-      <p:ext uri="{BB962C8B-B14F-4D97-AF65-F5344CB8AC3E}">
-        <p14:creationId xmlns:p14="http://schemas.microsoft.com/office/powerpoint/2010/main" val="3550726651"/>
       </p:ext>
     </p:extLst>
   </p:cSld>

</xml_diff>